<commit_message>
adding files and updating slides
</commit_message>
<xml_diff>
--- a/Project_1_Slides.pptx
+++ b/Project_1_Slides.pptx
@@ -13,10 +13,9 @@
     <p:sldId id="261" r:id="rId7"/>
     <p:sldId id="262" r:id="rId8"/>
     <p:sldId id="263" r:id="rId9"/>
-    <p:sldId id="264" r:id="rId10"/>
-    <p:sldId id="265" r:id="rId11"/>
-    <p:sldId id="266" r:id="rId12"/>
-    <p:sldId id="267" r:id="rId13"/>
+    <p:sldId id="265" r:id="rId10"/>
+    <p:sldId id="266" r:id="rId11"/>
+    <p:sldId id="267" r:id="rId12"/>
   </p:sldIdLst>
   <p:sldSz cx="12192000" cy="6858000"/>
   <p:notesSz cx="6858000" cy="9144000"/>
@@ -115,6 +114,11 @@
       </a:defRPr>
     </a:lvl9pPr>
   </p:defaultTextStyle>
+  <p:extLst>
+    <p:ext uri="{EFAFB233-063F-42B5-8137-9DF3F51BA10A}">
+      <p15:sldGuideLst xmlns:p15="http://schemas.microsoft.com/office/powerpoint/2012/main"/>
+    </p:ext>
+  </p:extLst>
 </p:presentation>
 </file>
 
@@ -265,7 +269,7 @@
           <a:p>
             <a:fld id="{40FB95BA-9913-4C64-8B39-27BEB02A3997}" type="datetimeFigureOut">
               <a:rPr lang="en-US" smtClean="0"/>
-              <a:t>4/5/2021</a:t>
+              <a:t>4/7/2021</a:t>
             </a:fld>
             <a:endParaRPr lang="en-US"/>
           </a:p>
@@ -463,7 +467,7 @@
           <a:p>
             <a:fld id="{40FB95BA-9913-4C64-8B39-27BEB02A3997}" type="datetimeFigureOut">
               <a:rPr lang="en-US" smtClean="0"/>
-              <a:t>4/5/2021</a:t>
+              <a:t>4/7/2021</a:t>
             </a:fld>
             <a:endParaRPr lang="en-US"/>
           </a:p>
@@ -671,7 +675,7 @@
           <a:p>
             <a:fld id="{40FB95BA-9913-4C64-8B39-27BEB02A3997}" type="datetimeFigureOut">
               <a:rPr lang="en-US" smtClean="0"/>
-              <a:t>4/5/2021</a:t>
+              <a:t>4/7/2021</a:t>
             </a:fld>
             <a:endParaRPr lang="en-US"/>
           </a:p>
@@ -869,7 +873,7 @@
           <a:p>
             <a:fld id="{40FB95BA-9913-4C64-8B39-27BEB02A3997}" type="datetimeFigureOut">
               <a:rPr lang="en-US" smtClean="0"/>
-              <a:t>4/5/2021</a:t>
+              <a:t>4/7/2021</a:t>
             </a:fld>
             <a:endParaRPr lang="en-US"/>
           </a:p>
@@ -1144,7 +1148,7 @@
           <a:p>
             <a:fld id="{40FB95BA-9913-4C64-8B39-27BEB02A3997}" type="datetimeFigureOut">
               <a:rPr lang="en-US" smtClean="0"/>
-              <a:t>4/5/2021</a:t>
+              <a:t>4/7/2021</a:t>
             </a:fld>
             <a:endParaRPr lang="en-US"/>
           </a:p>
@@ -1409,7 +1413,7 @@
           <a:p>
             <a:fld id="{40FB95BA-9913-4C64-8B39-27BEB02A3997}" type="datetimeFigureOut">
               <a:rPr lang="en-US" smtClean="0"/>
-              <a:t>4/5/2021</a:t>
+              <a:t>4/7/2021</a:t>
             </a:fld>
             <a:endParaRPr lang="en-US"/>
           </a:p>
@@ -1821,7 +1825,7 @@
           <a:p>
             <a:fld id="{40FB95BA-9913-4C64-8B39-27BEB02A3997}" type="datetimeFigureOut">
               <a:rPr lang="en-US" smtClean="0"/>
-              <a:t>4/5/2021</a:t>
+              <a:t>4/7/2021</a:t>
             </a:fld>
             <a:endParaRPr lang="en-US"/>
           </a:p>
@@ -1962,7 +1966,7 @@
           <a:p>
             <a:fld id="{40FB95BA-9913-4C64-8B39-27BEB02A3997}" type="datetimeFigureOut">
               <a:rPr lang="en-US" smtClean="0"/>
-              <a:t>4/5/2021</a:t>
+              <a:t>4/7/2021</a:t>
             </a:fld>
             <a:endParaRPr lang="en-US"/>
           </a:p>
@@ -2075,7 +2079,7 @@
           <a:p>
             <a:fld id="{40FB95BA-9913-4C64-8B39-27BEB02A3997}" type="datetimeFigureOut">
               <a:rPr lang="en-US" smtClean="0"/>
-              <a:t>4/5/2021</a:t>
+              <a:t>4/7/2021</a:t>
             </a:fld>
             <a:endParaRPr lang="en-US"/>
           </a:p>
@@ -2386,7 +2390,7 @@
           <a:p>
             <a:fld id="{40FB95BA-9913-4C64-8B39-27BEB02A3997}" type="datetimeFigureOut">
               <a:rPr lang="en-US" smtClean="0"/>
-              <a:t>4/5/2021</a:t>
+              <a:t>4/7/2021</a:t>
             </a:fld>
             <a:endParaRPr lang="en-US"/>
           </a:p>
@@ -2674,7 +2678,7 @@
           <a:p>
             <a:fld id="{40FB95BA-9913-4C64-8B39-27BEB02A3997}" type="datetimeFigureOut">
               <a:rPr lang="en-US" smtClean="0"/>
-              <a:t>4/5/2021</a:t>
+              <a:t>4/7/2021</a:t>
             </a:fld>
             <a:endParaRPr lang="en-US"/>
           </a:p>
@@ -2915,7 +2919,7 @@
           <a:p>
             <a:fld id="{40FB95BA-9913-4C64-8B39-27BEB02A3997}" type="datetimeFigureOut">
               <a:rPr lang="en-US" smtClean="0"/>
-              <a:t>4/5/2021</a:t>
+              <a:t>4/7/2021</a:t>
             </a:fld>
             <a:endParaRPr lang="en-US"/>
           </a:p>
@@ -3431,89 +3435,6 @@
           <p:cNvPr id="2" name="Title 1">
             <a:extLst>
               <a:ext uri="{FF2B5EF4-FFF2-40B4-BE49-F238E27FC236}">
-                <a16:creationId xmlns:a16="http://schemas.microsoft.com/office/drawing/2014/main" id="{AD69A769-05E7-40F8-898C-EC2C3A2879C8}"/>
-              </a:ext>
-            </a:extLst>
-          </p:cNvPr>
-          <p:cNvSpPr>
-            <a:spLocks noGrp="1"/>
-          </p:cNvSpPr>
-          <p:nvPr>
-            <p:ph type="title"/>
-          </p:nvPr>
-        </p:nvSpPr>
-        <p:spPr/>
-        <p:txBody>
-          <a:bodyPr/>
-          <a:lstStyle/>
-          <a:p>
-            <a:r>
-              <a:rPr lang="en-US" dirty="0"/>
-              <a:t>Findings and Conclusions</a:t>
-            </a:r>
-          </a:p>
-        </p:txBody>
-      </p:sp>
-      <p:sp>
-        <p:nvSpPr>
-          <p:cNvPr id="3" name="Content Placeholder 2">
-            <a:extLst>
-              <a:ext uri="{FF2B5EF4-FFF2-40B4-BE49-F238E27FC236}">
-                <a16:creationId xmlns:a16="http://schemas.microsoft.com/office/drawing/2014/main" id="{C447155F-51B3-4ED8-A4EA-932B2485D2B1}"/>
-              </a:ext>
-            </a:extLst>
-          </p:cNvPr>
-          <p:cNvSpPr>
-            <a:spLocks noGrp="1"/>
-          </p:cNvSpPr>
-          <p:nvPr>
-            <p:ph idx="1"/>
-          </p:nvPr>
-        </p:nvSpPr>
-        <p:spPr/>
-        <p:txBody>
-          <a:bodyPr/>
-          <a:lstStyle/>
-          <a:p>
-            <a:endParaRPr lang="en-US"/>
-          </a:p>
-        </p:txBody>
-      </p:sp>
-    </p:spTree>
-    <p:extLst>
-      <p:ext uri="{BB962C8B-B14F-4D97-AF65-F5344CB8AC3E}">
-        <p14:creationId xmlns:p14="http://schemas.microsoft.com/office/powerpoint/2010/main" val="1458736403"/>
-      </p:ext>
-    </p:extLst>
-  </p:cSld>
-  <p:clrMapOvr>
-    <a:masterClrMapping/>
-  </p:clrMapOvr>
-</p:sld>
-</file>
-
-<file path=ppt/slides/slide11.xml><?xml version="1.0" encoding="utf-8"?>
-<p:sld xmlns:a="http://schemas.openxmlformats.org/drawingml/2006/main" xmlns:r="http://schemas.openxmlformats.org/officeDocument/2006/relationships" xmlns:p="http://schemas.openxmlformats.org/presentationml/2006/main">
-  <p:cSld>
-    <p:spTree>
-      <p:nvGrpSpPr>
-        <p:cNvPr id="1" name=""/>
-        <p:cNvGrpSpPr/>
-        <p:nvPr/>
-      </p:nvGrpSpPr>
-      <p:grpSpPr>
-        <a:xfrm>
-          <a:off x="0" y="0"/>
-          <a:ext cx="0" cy="0"/>
-          <a:chOff x="0" y="0"/>
-          <a:chExt cx="0" cy="0"/>
-        </a:xfrm>
-      </p:grpSpPr>
-      <p:sp>
-        <p:nvSpPr>
-          <p:cNvPr id="2" name="Title 1">
-            <a:extLst>
-              <a:ext uri="{FF2B5EF4-FFF2-40B4-BE49-F238E27FC236}">
                 <a16:creationId xmlns:a16="http://schemas.microsoft.com/office/drawing/2014/main" id="{992C297E-E4D6-4215-A953-C926EE4CB779}"/>
               </a:ext>
             </a:extLst>
@@ -3590,7 +3511,7 @@
 </p:sld>
 </file>
 
-<file path=ppt/slides/slide12.xml><?xml version="1.0" encoding="utf-8"?>
+<file path=ppt/slides/slide11.xml><?xml version="1.0" encoding="utf-8"?>
 <p:sld xmlns:a="http://schemas.openxmlformats.org/drawingml/2006/main" xmlns:r="http://schemas.openxmlformats.org/officeDocument/2006/relationships" xmlns:p="http://schemas.openxmlformats.org/presentationml/2006/main">
   <p:cSld>
     <p:spTree>
@@ -3931,7 +3852,7 @@
           <a:p>
             <a:r>
               <a:rPr lang="en-US" dirty="0"/>
-              <a:t>Sources:</a:t>
+              <a:t>Sources: *link to datasets</a:t>
             </a:r>
           </a:p>
           <a:p>
@@ -3939,6 +3860,32 @@
               <a:rPr lang="en-US" dirty="0"/>
               <a:t>Cleanup process:</a:t>
             </a:r>
+          </a:p>
+          <a:p>
+            <a:pPr lvl="1"/>
+            <a:r>
+              <a:rPr lang="en-US" dirty="0"/>
+              <a:t>Pandas (parse, column changes, name changes, removing nulls </a:t>
+            </a:r>
+            <a:r>
+              <a:rPr lang="en-US" dirty="0" err="1"/>
+              <a:t>etc</a:t>
+            </a:r>
+            <a:r>
+              <a:rPr lang="en-US" dirty="0"/>
+              <a:t>)</a:t>
+            </a:r>
+          </a:p>
+          <a:p>
+            <a:pPr lvl="1"/>
+            <a:r>
+              <a:rPr lang="en-US" dirty="0"/>
+              <a:t>Excel manual manipulation</a:t>
+            </a:r>
+          </a:p>
+          <a:p>
+            <a:pPr lvl="1"/>
+            <a:endParaRPr lang="en-US" dirty="0"/>
           </a:p>
         </p:txBody>
       </p:sp>
@@ -3995,7 +3942,7 @@
           <a:p>
             <a:r>
               <a:rPr lang="en-US" dirty="0"/>
-              <a:t>Data Analysis</a:t>
+              <a:t>Data Analysis: (covid case change)</a:t>
             </a:r>
           </a:p>
         </p:txBody>
@@ -4021,7 +3968,7 @@
           <a:bodyPr/>
           <a:lstStyle/>
           <a:p>
-            <a:endParaRPr lang="en-US"/>
+            <a:endParaRPr lang="en-US" dirty="0"/>
           </a:p>
         </p:txBody>
       </p:sp>
@@ -4078,7 +4025,7 @@
           <a:p>
             <a:r>
               <a:rPr lang="en-US" dirty="0"/>
-              <a:t>Data Analysis</a:t>
+              <a:t>Data Analysis (unemployment)</a:t>
             </a:r>
           </a:p>
         </p:txBody>
@@ -4161,7 +4108,7 @@
           <a:p>
             <a:r>
               <a:rPr lang="en-US" dirty="0"/>
-              <a:t>Data Analysis</a:t>
+              <a:t>Data Analysis (real estate &amp; mortgage)</a:t>
             </a:r>
           </a:p>
         </p:txBody>
@@ -4187,7 +4134,7 @@
           <a:bodyPr/>
           <a:lstStyle/>
           <a:p>
-            <a:endParaRPr lang="en-US"/>
+            <a:endParaRPr lang="en-US" dirty="0"/>
           </a:p>
         </p:txBody>
       </p:sp>
@@ -4244,7 +4191,7 @@
           <a:p>
             <a:r>
               <a:rPr lang="en-US" dirty="0"/>
-              <a:t>Data Analysis</a:t>
+              <a:t>Data Analysis (personal consumption exp)</a:t>
             </a:r>
           </a:p>
         </p:txBody>
@@ -4309,7 +4256,7 @@
           <p:cNvPr id="2" name="Title 1">
             <a:extLst>
               <a:ext uri="{FF2B5EF4-FFF2-40B4-BE49-F238E27FC236}">
-                <a16:creationId xmlns:a16="http://schemas.microsoft.com/office/drawing/2014/main" id="{6EDF7250-939C-4030-9193-FA801466A631}"/>
+                <a16:creationId xmlns:a16="http://schemas.microsoft.com/office/drawing/2014/main" id="{AD69A769-05E7-40F8-898C-EC2C3A2879C8}"/>
               </a:ext>
             </a:extLst>
           </p:cNvPr>
@@ -4327,7 +4274,7 @@
           <a:p>
             <a:r>
               <a:rPr lang="en-US" dirty="0"/>
-              <a:t>Data Analysis</a:t>
+              <a:t>Findings and Conclusions</a:t>
             </a:r>
           </a:p>
         </p:txBody>
@@ -4337,7 +4284,7 @@
           <p:cNvPr id="3" name="Content Placeholder 2">
             <a:extLst>
               <a:ext uri="{FF2B5EF4-FFF2-40B4-BE49-F238E27FC236}">
-                <a16:creationId xmlns:a16="http://schemas.microsoft.com/office/drawing/2014/main" id="{06F220F6-45D0-47BC-ACC3-38E6FAF5BC53}"/>
+                <a16:creationId xmlns:a16="http://schemas.microsoft.com/office/drawing/2014/main" id="{C447155F-51B3-4ED8-A4EA-932B2485D2B1}"/>
               </a:ext>
             </a:extLst>
           </p:cNvPr>
@@ -4353,14 +4300,14 @@
           <a:bodyPr/>
           <a:lstStyle/>
           <a:p>
-            <a:endParaRPr lang="en-US"/>
+            <a:endParaRPr lang="en-US" dirty="0"/>
           </a:p>
         </p:txBody>
       </p:sp>
     </p:spTree>
     <p:extLst>
       <p:ext uri="{BB962C8B-B14F-4D97-AF65-F5344CB8AC3E}">
-        <p14:creationId xmlns:p14="http://schemas.microsoft.com/office/powerpoint/2010/main" val="642076707"/>
+        <p14:creationId xmlns:p14="http://schemas.microsoft.com/office/powerpoint/2010/main" val="1458736403"/>
       </p:ext>
     </p:extLst>
   </p:cSld>

</xml_diff>

<commit_message>
adding data to slides
</commit_message>
<xml_diff>
--- a/Project_1_Slides.pptx
+++ b/Project_1_Slides.pptx
@@ -4459,7 +4459,7 @@
         <p:spPr/>
         <p:txBody>
           <a:bodyPr>
-            <a:normAutofit/>
+            <a:normAutofit lnSpcReduction="10000"/>
           </a:bodyPr>
           <a:lstStyle/>
           <a:p>
@@ -4471,7 +4471,7 @@
           <a:p>
             <a:pPr marL="457200" lvl="2">
               <a:lnSpc>
-                <a:spcPct val="95000"/>
+                <a:spcPct val="100000"/>
               </a:lnSpc>
               <a:spcBef>
                 <a:spcPts val="1400"/>
@@ -4495,7 +4495,7 @@
           <a:p>
             <a:pPr marL="457200" lvl="2">
               <a:lnSpc>
-                <a:spcPct val="95000"/>
+                <a:spcPct val="100000"/>
               </a:lnSpc>
               <a:spcBef>
                 <a:spcPts val="1400"/>
@@ -4519,7 +4519,7 @@
           <a:p>
             <a:pPr marL="457200" lvl="2">
               <a:lnSpc>
-                <a:spcPct val="95000"/>
+                <a:spcPct val="100000"/>
               </a:lnSpc>
               <a:spcBef>
                 <a:spcPts val="1400"/>
@@ -4543,7 +4543,7 @@
           <a:p>
             <a:pPr marL="457200" lvl="2">
               <a:lnSpc>
-                <a:spcPct val="95000"/>
+                <a:spcPct val="100000"/>
               </a:lnSpc>
               <a:spcBef>
                 <a:spcPts val="1400"/>
@@ -4565,8 +4565,37 @@
             </a:r>
           </a:p>
           <a:p>
-            <a:pPr lvl="1"/>
-            <a:endParaRPr lang="en-US" sz="1600" dirty="0"/>
+            <a:pPr lvl="1">
+              <a:lnSpc>
+                <a:spcPct val="100000"/>
+              </a:lnSpc>
+            </a:pPr>
+            <a:r>
+              <a:rPr lang="en-US" sz="1600" dirty="0"/>
+              <a:t>Realtor.com</a:t>
+            </a:r>
+          </a:p>
+          <a:p>
+            <a:pPr lvl="1">
+              <a:lnSpc>
+                <a:spcPct val="100000"/>
+              </a:lnSpc>
+            </a:pPr>
+            <a:r>
+              <a:rPr lang="en-US" dirty="0"/>
+              <a:t>Census Bureau</a:t>
+            </a:r>
+          </a:p>
+          <a:p>
+            <a:pPr lvl="1">
+              <a:lnSpc>
+                <a:spcPct val="100000"/>
+              </a:lnSpc>
+            </a:pPr>
+            <a:r>
+              <a:rPr lang="en-US" sz="1600" dirty="0"/>
+              <a:t>Federal Reserve Bank of New York</a:t>
+            </a:r>
           </a:p>
           <a:p>
             <a:pPr lvl="2"/>
@@ -4591,10 +4620,6 @@
               <a:rPr lang="en-US" dirty="0"/>
               <a:t>Excel manual manipulation for difficult formatting</a:t>
             </a:r>
-          </a:p>
-          <a:p>
-            <a:pPr lvl="1"/>
-            <a:endParaRPr lang="en-US" dirty="0"/>
           </a:p>
         </p:txBody>
       </p:sp>

</xml_diff>